<commit_message>
Updated Previous Work Slide
</commit_message>
<xml_diff>
--- a/Project Proposal.pptx
+++ b/Project Proposal.pptx
@@ -3762,7 +3762,7 @@
           <a:p>
             <a:r>
               <a:rPr lang="en-US" dirty="0"/>
-              <a:t>Previously done work</a:t>
+              <a:t>Previous Work</a:t>
             </a:r>
           </a:p>
         </p:txBody>
@@ -3783,12 +3783,73 @@
             <p:ph idx="1"/>
           </p:nvPr>
         </p:nvSpPr>
-        <p:spPr/>
-        <p:txBody>
-          <a:bodyPr/>
-          <a:lstStyle/>
-          <a:p>
-            <a:endParaRPr lang="en-US"/>
+        <p:spPr>
+          <a:xfrm>
+            <a:off x="838200" y="1825625"/>
+            <a:ext cx="10515600" cy="4351338"/>
+          </a:xfrm>
+        </p:spPr>
+        <p:txBody>
+          <a:bodyPr/>
+          <a:lstStyle/>
+          <a:p>
+            <a:r>
+              <a:rPr lang="en-US" dirty="0"/>
+              <a:t>Worked on implementing an AIM System for a </a:t>
+            </a:r>
+            <a:r>
+              <a:rPr lang="en-US"/>
+              <a:t>previous class</a:t>
+            </a:r>
+          </a:p>
+          <a:p>
+            <a:r>
+              <a:rPr lang="en-US" dirty="0"/>
+              <a:t>“A Multiagent Approach to Autonomous Intersection Management” by Kurt </a:t>
+            </a:r>
+            <a:r>
+              <a:rPr lang="en-US" dirty="0" err="1"/>
+              <a:t>Dresner</a:t>
+            </a:r>
+            <a:r>
+              <a:rPr lang="en-US" dirty="0"/>
+              <a:t> and Peter Stone</a:t>
+            </a:r>
+          </a:p>
+          <a:p>
+            <a:pPr lvl="1"/>
+            <a:r>
+              <a:rPr lang="en-US" dirty="0"/>
+              <a:t>Reservation system using first-come-first-serve policy</a:t>
+            </a:r>
+          </a:p>
+          <a:p>
+            <a:pPr lvl="1"/>
+            <a:r>
+              <a:rPr lang="en-US" dirty="0"/>
+              <a:t>Use of a grid of “reservation” tiles</a:t>
+            </a:r>
+          </a:p>
+          <a:p>
+            <a:pPr lvl="1"/>
+            <a:r>
+              <a:rPr lang="en-US" dirty="0"/>
+              <a:t>Dealing with acceleration in the intersection. Consider trajectories where the vehicle accelerates to max velocity, and maintains current velocity</a:t>
+            </a:r>
+          </a:p>
+          <a:p>
+            <a:pPr lvl="1"/>
+            <a:r>
+              <a:rPr lang="en-US" dirty="0"/>
+              <a:t>Force a minimum velocity</a:t>
+            </a:r>
+          </a:p>
+          <a:p>
+            <a:pPr lvl="1"/>
+            <a:r>
+              <a:rPr lang="en-US" dirty="0"/>
+              <a:t>Ability to change the policy</a:t>
+            </a:r>
           </a:p>
         </p:txBody>
       </p:sp>

</xml_diff>

<commit_message>
Added changes to powerpoint
</commit_message>
<xml_diff>
--- a/Project Proposal.pptx
+++ b/Project Proposal.pptx
@@ -10,9 +10,9 @@
   <p:sldIdLst>
     <p:sldId id="256" r:id="rId2"/>
     <p:sldId id="258" r:id="rId3"/>
-    <p:sldId id="261" r:id="rId4"/>
-    <p:sldId id="257" r:id="rId5"/>
-    <p:sldId id="259" r:id="rId6"/>
+    <p:sldId id="257" r:id="rId4"/>
+    <p:sldId id="259" r:id="rId5"/>
+    <p:sldId id="261" r:id="rId6"/>
     <p:sldId id="260" r:id="rId7"/>
   </p:sldIdLst>
   <p:sldSz cx="12192000" cy="6858000"/>
@@ -202,7 +202,7 @@
           <a:p>
             <a:fld id="{C3E22199-0812-433D-8264-D4E89DC2681E}" type="datetimeFigureOut">
               <a:rPr lang="en-US" smtClean="0"/>
-              <a:t>10/20/2019</a:t>
+              <a:t>10/21/2019</a:t>
             </a:fld>
             <a:endParaRPr lang="en-US"/>
           </a:p>
@@ -706,7 +706,7 @@
           <a:p>
             <a:fld id="{7DB024AA-E761-4936-A8AA-B3393A083200}" type="datetimeFigureOut">
               <a:rPr lang="en-US" smtClean="0"/>
-              <a:t>10/20/2019</a:t>
+              <a:t>10/21/2019</a:t>
             </a:fld>
             <a:endParaRPr lang="en-US"/>
           </a:p>
@@ -904,7 +904,7 @@
           <a:p>
             <a:fld id="{7DB024AA-E761-4936-A8AA-B3393A083200}" type="datetimeFigureOut">
               <a:rPr lang="en-US" smtClean="0"/>
-              <a:t>10/20/2019</a:t>
+              <a:t>10/21/2019</a:t>
             </a:fld>
             <a:endParaRPr lang="en-US"/>
           </a:p>
@@ -1112,7 +1112,7 @@
           <a:p>
             <a:fld id="{7DB024AA-E761-4936-A8AA-B3393A083200}" type="datetimeFigureOut">
               <a:rPr lang="en-US" smtClean="0"/>
-              <a:t>10/20/2019</a:t>
+              <a:t>10/21/2019</a:t>
             </a:fld>
             <a:endParaRPr lang="en-US"/>
           </a:p>
@@ -1310,7 +1310,7 @@
           <a:p>
             <a:fld id="{7DB024AA-E761-4936-A8AA-B3393A083200}" type="datetimeFigureOut">
               <a:rPr lang="en-US" smtClean="0"/>
-              <a:t>10/20/2019</a:t>
+              <a:t>10/21/2019</a:t>
             </a:fld>
             <a:endParaRPr lang="en-US"/>
           </a:p>
@@ -1585,7 +1585,7 @@
           <a:p>
             <a:fld id="{7DB024AA-E761-4936-A8AA-B3393A083200}" type="datetimeFigureOut">
               <a:rPr lang="en-US" smtClean="0"/>
-              <a:t>10/20/2019</a:t>
+              <a:t>10/21/2019</a:t>
             </a:fld>
             <a:endParaRPr lang="en-US"/>
           </a:p>
@@ -1850,7 +1850,7 @@
           <a:p>
             <a:fld id="{7DB024AA-E761-4936-A8AA-B3393A083200}" type="datetimeFigureOut">
               <a:rPr lang="en-US" smtClean="0"/>
-              <a:t>10/20/2019</a:t>
+              <a:t>10/21/2019</a:t>
             </a:fld>
             <a:endParaRPr lang="en-US"/>
           </a:p>
@@ -2262,7 +2262,7 @@
           <a:p>
             <a:fld id="{7DB024AA-E761-4936-A8AA-B3393A083200}" type="datetimeFigureOut">
               <a:rPr lang="en-US" smtClean="0"/>
-              <a:t>10/20/2019</a:t>
+              <a:t>10/21/2019</a:t>
             </a:fld>
             <a:endParaRPr lang="en-US"/>
           </a:p>
@@ -2403,7 +2403,7 @@
           <a:p>
             <a:fld id="{7DB024AA-E761-4936-A8AA-B3393A083200}" type="datetimeFigureOut">
               <a:rPr lang="en-US" smtClean="0"/>
-              <a:t>10/20/2019</a:t>
+              <a:t>10/21/2019</a:t>
             </a:fld>
             <a:endParaRPr lang="en-US"/>
           </a:p>
@@ -2516,7 +2516,7 @@
           <a:p>
             <a:fld id="{7DB024AA-E761-4936-A8AA-B3393A083200}" type="datetimeFigureOut">
               <a:rPr lang="en-US" smtClean="0"/>
-              <a:t>10/20/2019</a:t>
+              <a:t>10/21/2019</a:t>
             </a:fld>
             <a:endParaRPr lang="en-US"/>
           </a:p>
@@ -2827,7 +2827,7 @@
           <a:p>
             <a:fld id="{7DB024AA-E761-4936-A8AA-B3393A083200}" type="datetimeFigureOut">
               <a:rPr lang="en-US" smtClean="0"/>
-              <a:t>10/20/2019</a:t>
+              <a:t>10/21/2019</a:t>
             </a:fld>
             <a:endParaRPr lang="en-US"/>
           </a:p>
@@ -3115,7 +3115,7 @@
           <a:p>
             <a:fld id="{7DB024AA-E761-4936-A8AA-B3393A083200}" type="datetimeFigureOut">
               <a:rPr lang="en-US" smtClean="0"/>
-              <a:t>10/20/2019</a:t>
+              <a:t>10/21/2019</a:t>
             </a:fld>
             <a:endParaRPr lang="en-US"/>
           </a:p>
@@ -3356,7 +3356,7 @@
           <a:p>
             <a:fld id="{7DB024AA-E761-4936-A8AA-B3393A083200}" type="datetimeFigureOut">
               <a:rPr lang="en-US" smtClean="0"/>
-              <a:t>10/20/2019</a:t>
+              <a:t>10/21/2019</a:t>
             </a:fld>
             <a:endParaRPr lang="en-US"/>
           </a:p>
@@ -3792,7 +3792,7 @@
         <p:spPr/>
         <p:txBody>
           <a:bodyPr>
-            <a:normAutofit fontScale="90000"/>
+            <a:normAutofit/>
           </a:bodyPr>
           <a:lstStyle/>
           <a:p>
@@ -3810,26 +3810,39 @@
       </p:sp>
       <p:sp>
         <p:nvSpPr>
-          <p:cNvPr id="3" name="Subtitle 2">
-            <a:extLst>
-              <a:ext uri="{FF2B5EF4-FFF2-40B4-BE49-F238E27FC236}">
-                <a16:creationId xmlns:a16="http://schemas.microsoft.com/office/drawing/2014/main" id="{E2B69AF8-EE19-4CC2-B185-594EEE9F640D}"/>
-              </a:ext>
-            </a:extLst>
-          </p:cNvPr>
-          <p:cNvSpPr>
-            <a:spLocks noGrp="1"/>
-          </p:cNvSpPr>
-          <p:nvPr>
-            <p:ph type="subTitle" idx="1"/>
-          </p:nvPr>
-        </p:nvSpPr>
-        <p:spPr/>
-        <p:txBody>
-          <a:bodyPr/>
-          <a:lstStyle/>
-          <a:p>
-            <a:endParaRPr lang="en-US"/>
+          <p:cNvPr id="4" name="TextBox 3">
+            <a:extLst>
+              <a:ext uri="{FF2B5EF4-FFF2-40B4-BE49-F238E27FC236}">
+                <a16:creationId xmlns:a16="http://schemas.microsoft.com/office/drawing/2014/main" id="{3AF5001D-3500-4F64-B7CC-BBB8705FDECF}"/>
+              </a:ext>
+            </a:extLst>
+          </p:cNvPr>
+          <p:cNvSpPr txBox="1"/>
+          <p:nvPr/>
+        </p:nvSpPr>
+        <p:spPr>
+          <a:xfrm>
+            <a:off x="9202189" y="6001790"/>
+            <a:ext cx="2931622" cy="369332"/>
+          </a:xfrm>
+          <a:prstGeom prst="rect">
+            <a:avLst/>
+          </a:prstGeom>
+          <a:noFill/>
+        </p:spPr>
+        <p:txBody>
+          <a:bodyPr wrap="square" rtlCol="0">
+            <a:spAutoFit/>
+          </a:bodyPr>
+          <a:lstStyle/>
+          <a:p>
+            <a:r>
+              <a:rPr lang="en-US" dirty="0">
+                <a:latin typeface="Andalus" panose="02020603050405020304" pitchFamily="18" charset="-78"/>
+                <a:cs typeface="Andalus" panose="02020603050405020304" pitchFamily="18" charset="-78"/>
+              </a:rPr>
+              <a:t>Ahmed Fayed &amp; Alex Winger</a:t>
+            </a:r>
           </a:p>
         </p:txBody>
       </p:sp>
@@ -3885,180 +3898,81 @@
           <a:lstStyle/>
           <a:p>
             <a:r>
+              <a:rPr lang="en-US" dirty="0">
+                <a:latin typeface="Andalus" panose="02020603050405020304" pitchFamily="18" charset="-78"/>
+                <a:cs typeface="Andalus" panose="02020603050405020304" pitchFamily="18" charset="-78"/>
+              </a:rPr>
+              <a:t>Introduction about AIM and Motivation</a:t>
+            </a:r>
+          </a:p>
+        </p:txBody>
+      </p:sp>
+      <p:sp>
+        <p:nvSpPr>
+          <p:cNvPr id="3" name="Content Placeholder 2">
+            <a:extLst>
+              <a:ext uri="{FF2B5EF4-FFF2-40B4-BE49-F238E27FC236}">
+                <a16:creationId xmlns:a16="http://schemas.microsoft.com/office/drawing/2014/main" id="{04B25F37-C51B-4276-B011-0C8C944FF685}"/>
+              </a:ext>
+            </a:extLst>
+          </p:cNvPr>
+          <p:cNvSpPr>
+            <a:spLocks noGrp="1"/>
+          </p:cNvSpPr>
+          <p:nvPr>
+            <p:ph idx="1"/>
+          </p:nvPr>
+        </p:nvSpPr>
+        <p:spPr/>
+        <p:txBody>
+          <a:bodyPr>
+            <a:normAutofit/>
+          </a:bodyPr>
+          <a:lstStyle/>
+          <a:p>
+            <a:r>
               <a:rPr lang="en-US" dirty="0"/>
-              <a:t>Introduction about AIM and motivation</a:t>
-            </a:r>
-          </a:p>
-        </p:txBody>
-      </p:sp>
-      <p:sp>
-        <p:nvSpPr>
-          <p:cNvPr id="3" name="Content Placeholder 2">
-            <a:extLst>
-              <a:ext uri="{FF2B5EF4-FFF2-40B4-BE49-F238E27FC236}">
-                <a16:creationId xmlns:a16="http://schemas.microsoft.com/office/drawing/2014/main" id="{04B25F37-C51B-4276-B011-0C8C944FF685}"/>
-              </a:ext>
-            </a:extLst>
-          </p:cNvPr>
-          <p:cNvSpPr>
-            <a:spLocks noGrp="1"/>
-          </p:cNvSpPr>
-          <p:nvPr>
-            <p:ph idx="1"/>
-          </p:nvPr>
-        </p:nvSpPr>
-        <p:spPr/>
-        <p:txBody>
-          <a:bodyPr>
-            <a:normAutofit fontScale="92500" lnSpcReduction="10000"/>
-          </a:bodyPr>
-          <a:lstStyle/>
-          <a:p>
-            <a:pPr marL="0" indent="0">
-              <a:buNone/>
-            </a:pPr>
-            <a:endParaRPr lang="en-US" sz="1800" dirty="0">
-              <a:effectLst>
-                <a:outerShdw blurRad="38100" dist="38100" dir="2700000" algn="tl">
-                  <a:srgbClr val="000000">
-                    <a:alpha val="43137"/>
-                  </a:srgbClr>
-                </a:outerShdw>
-              </a:effectLst>
-            </a:endParaRPr>
-          </a:p>
-          <a:p>
-            <a:r>
-              <a:rPr lang="en-US" sz="1800" dirty="0">
-                <a:effectLst>
-                  <a:outerShdw blurRad="38100" dist="38100" dir="2700000" algn="tl">
-                    <a:srgbClr val="000000">
-                      <a:alpha val="43137"/>
-                    </a:srgbClr>
-                  </a:outerShdw>
-                </a:effectLst>
-              </a:rPr>
-              <a:t>Idea: Autonomously and efficiently manage/schedule vehicles through a 4-way dedicated lane intersection.</a:t>
-            </a:r>
-          </a:p>
-          <a:p>
-            <a:r>
-              <a:rPr lang="en-US" sz="1800" dirty="0"/>
-              <a:t>Vehicle collisions at intersections account for anywhere between 25% and 45% of all collisions. – Kurt </a:t>
-            </a:r>
-            <a:r>
-              <a:rPr lang="en-US" sz="1800" dirty="0" err="1"/>
+              <a:t>Idea: Autonomously and efficiently manage/schedule vehicles through an intersection.</a:t>
+            </a:r>
+          </a:p>
+          <a:p>
+            <a:pPr lvl="1"/>
+            <a:r>
+              <a:rPr lang="en-US" dirty="0"/>
+              <a:t>Significantly outperform current intersection technology </a:t>
+            </a:r>
+          </a:p>
+          <a:p>
+            <a:pPr lvl="1"/>
+            <a:r>
+              <a:rPr lang="en-US" dirty="0"/>
+              <a:t>Minimizes vehicle Delay (better metric than throughput)</a:t>
+            </a:r>
+          </a:p>
+          <a:p>
+            <a:pPr lvl="1"/>
+            <a:r>
+              <a:rPr lang="en-US" dirty="0"/>
+              <a:t>“Vehicle collisions at intersections account for anywhere between 25% and 45% of all collisions.” – Kurt </a:t>
+            </a:r>
+            <a:r>
+              <a:rPr lang="en-US" dirty="0" err="1"/>
               <a:t>Dresnor</a:t>
             </a:r>
-            <a:endParaRPr lang="en-US" sz="1800" dirty="0"/>
-          </a:p>
-          <a:p>
-            <a:r>
-              <a:rPr lang="en-US" sz="1800" dirty="0"/>
-              <a:t>By keeping the number of messages and amount of information transmitted to a minimum, the system can afford to put more communication reliability measures in place. Furthermore, each vehicle, as an autonomous agent, may have privacy concerns which should be respected. Keeping the communication complexity low will also make the system more scalable.</a:t>
-            </a:r>
-          </a:p>
-          <a:p>
-            <a:r>
-              <a:rPr lang="en-US" sz="1800" dirty="0">
-                <a:effectLst>
-                  <a:outerShdw blurRad="38100" dist="38100" dir="2700000" algn="tl">
-                    <a:srgbClr val="000000">
-                      <a:alpha val="43137"/>
-                    </a:srgbClr>
-                  </a:outerShdw>
-                </a:effectLst>
-              </a:rPr>
-              <a:t>Focusing less on Driver Agents and mostly on the arbiter/Intersection Manager</a:t>
-            </a:r>
-          </a:p>
-          <a:p>
-            <a:r>
-              <a:rPr lang="en-US" sz="1800" dirty="0">
-                <a:effectLst>
-                  <a:outerShdw blurRad="38100" dist="38100" dir="2700000" algn="tl">
-                    <a:srgbClr val="000000">
-                      <a:alpha val="43137"/>
-                    </a:srgbClr>
-                  </a:outerShdw>
-                </a:effectLst>
-              </a:rPr>
-              <a:t>Assumptions: </a:t>
-            </a:r>
+            <a:endParaRPr lang="en-US" dirty="0"/>
           </a:p>
           <a:p>
             <a:pPr lvl="1"/>
             <a:r>
-              <a:rPr lang="en-US" sz="1800" dirty="0">
-                <a:effectLst>
-                  <a:outerShdw blurRad="38100" dist="38100" dir="2700000" algn="tl">
-                    <a:srgbClr val="000000">
-                      <a:alpha val="43137"/>
-                    </a:srgbClr>
-                  </a:outerShdw>
-                </a:effectLst>
-              </a:rPr>
-              <a:t>Fully autonomous vehicles (Tesla Model S P100D)</a:t>
+              <a:rPr lang="en-US" dirty="0"/>
+              <a:t>Negates the need for expensive infrastructure (i.e. cloverleaf interchanges)</a:t>
             </a:r>
           </a:p>
           <a:p>
             <a:pPr lvl="1"/>
             <a:r>
-              <a:rPr lang="en-US" sz="1800" dirty="0">
-                <a:effectLst>
-                  <a:outerShdw blurRad="38100" dist="38100" dir="2700000" algn="tl">
-                    <a:srgbClr val="000000">
-                      <a:alpha val="43137"/>
-                    </a:srgbClr>
-                  </a:outerShdw>
-                </a:effectLst>
-              </a:rPr>
-              <a:t>5G telecommunication (minimal delay) no communication failure</a:t>
-            </a:r>
-          </a:p>
-          <a:p>
-            <a:pPr lvl="1"/>
-            <a:r>
-              <a:rPr lang="en-US" sz="1800" dirty="0">
-                <a:effectLst>
-                  <a:outerShdw blurRad="38100" dist="38100" dir="2700000" algn="tl">
-                    <a:srgbClr val="000000">
-                      <a:alpha val="43137"/>
-                    </a:srgbClr>
-                  </a:outerShdw>
-                </a:effectLst>
-              </a:rPr>
-              <a:t>Centralized architecture with a high resource powerful computer system placed at the intersection powering the Intersection Manager (IM)</a:t>
-            </a:r>
-          </a:p>
-          <a:p>
-            <a:pPr lvl="1"/>
-            <a:r>
-              <a:rPr lang="en-US" sz="1800" dirty="0">
-                <a:effectLst>
-                  <a:outerShdw blurRad="38100" dist="38100" dir="2700000" algn="tl">
-                    <a:srgbClr val="000000">
-                      <a:alpha val="43137"/>
-                    </a:srgbClr>
-                  </a:outerShdw>
-                </a:effectLst>
-              </a:rPr>
-              <a:t>No error</a:t>
-            </a:r>
-          </a:p>
-          <a:p>
-            <a:r>
-              <a:rPr lang="en-US" sz="1800" dirty="0">
-                <a:effectLst>
-                  <a:outerShdw blurRad="38100" dist="38100" dir="2700000" algn="tl">
-                    <a:srgbClr val="000000">
-                      <a:alpha val="43137"/>
-                    </a:srgbClr>
-                  </a:outerShdw>
-                </a:effectLst>
-                <a:cs typeface="Traditional Arabic" panose="02020603050405020304" pitchFamily="18" charset="-78"/>
-              </a:rPr>
-              <a:t>To accomplish this we intend to use ROS, and a visualization software.</a:t>
+              <a:rPr lang="en-US" dirty="0"/>
+              <a:t>Vastly more adaptable than current systems</a:t>
             </a:r>
           </a:p>
           <a:p>
@@ -4089,6 +4003,295 @@
 </file>
 
 <file path=ppt/slides/slide3.xml><?xml version="1.0" encoding="utf-8"?>
+<p:sld xmlns:a="http://schemas.openxmlformats.org/drawingml/2006/main" xmlns:r="http://schemas.openxmlformats.org/officeDocument/2006/relationships" xmlns:p="http://schemas.openxmlformats.org/presentationml/2006/main">
+  <p:cSld>
+    <p:spTree>
+      <p:nvGrpSpPr>
+        <p:cNvPr id="1" name=""/>
+        <p:cNvGrpSpPr/>
+        <p:nvPr/>
+      </p:nvGrpSpPr>
+      <p:grpSpPr>
+        <a:xfrm>
+          <a:off x="0" y="0"/>
+          <a:ext cx="0" cy="0"/>
+          <a:chOff x="0" y="0"/>
+          <a:chExt cx="0" cy="0"/>
+        </a:xfrm>
+      </p:grpSpPr>
+      <p:sp>
+        <p:nvSpPr>
+          <p:cNvPr id="2" name="Title 1">
+            <a:extLst>
+              <a:ext uri="{FF2B5EF4-FFF2-40B4-BE49-F238E27FC236}">
+                <a16:creationId xmlns:a16="http://schemas.microsoft.com/office/drawing/2014/main" id="{DF2DACD5-3964-49E8-9CE0-0B08B7E5CADE}"/>
+              </a:ext>
+            </a:extLst>
+          </p:cNvPr>
+          <p:cNvSpPr>
+            <a:spLocks noGrp="1"/>
+          </p:cNvSpPr>
+          <p:nvPr>
+            <p:ph type="title"/>
+          </p:nvPr>
+        </p:nvSpPr>
+        <p:spPr/>
+        <p:txBody>
+          <a:bodyPr/>
+          <a:lstStyle/>
+          <a:p>
+            <a:r>
+              <a:rPr lang="en-US" dirty="0">
+                <a:latin typeface="Andalus" panose="02020603050405020304" pitchFamily="18" charset="-78"/>
+                <a:cs typeface="Andalus" panose="02020603050405020304" pitchFamily="18" charset="-78"/>
+              </a:rPr>
+              <a:t>Previous Work &amp; Feasibility</a:t>
+            </a:r>
+            <a:endParaRPr lang="en-US" dirty="0"/>
+          </a:p>
+        </p:txBody>
+      </p:sp>
+      <p:sp>
+        <p:nvSpPr>
+          <p:cNvPr id="3" name="Content Placeholder 2">
+            <a:extLst>
+              <a:ext uri="{FF2B5EF4-FFF2-40B4-BE49-F238E27FC236}">
+                <a16:creationId xmlns:a16="http://schemas.microsoft.com/office/drawing/2014/main" id="{3872D00B-8186-4575-85F6-68F3C00DF72C}"/>
+              </a:ext>
+            </a:extLst>
+          </p:cNvPr>
+          <p:cNvSpPr>
+            <a:spLocks noGrp="1"/>
+          </p:cNvSpPr>
+          <p:nvPr>
+            <p:ph idx="1"/>
+          </p:nvPr>
+        </p:nvSpPr>
+        <p:spPr>
+          <a:xfrm>
+            <a:off x="838200" y="1825625"/>
+            <a:ext cx="10515600" cy="4351338"/>
+          </a:xfrm>
+        </p:spPr>
+        <p:txBody>
+          <a:bodyPr/>
+          <a:lstStyle/>
+          <a:p>
+            <a:r>
+              <a:rPr lang="en-US" dirty="0"/>
+              <a:t>Worked on implementing an AIM System for a previous class</a:t>
+            </a:r>
+          </a:p>
+          <a:p>
+            <a:r>
+              <a:rPr lang="en-US" dirty="0"/>
+              <a:t>“A Multiagent Approach to Autonomous Intersection Management” by Kurt </a:t>
+            </a:r>
+            <a:r>
+              <a:rPr lang="en-US" dirty="0" err="1"/>
+              <a:t>Dresner</a:t>
+            </a:r>
+            <a:r>
+              <a:rPr lang="en-US" dirty="0"/>
+              <a:t> and Peter Stone</a:t>
+            </a:r>
+          </a:p>
+          <a:p>
+            <a:pPr lvl="1"/>
+            <a:r>
+              <a:rPr lang="en-US" dirty="0"/>
+              <a:t>Reservation system using “First Come, First Served” policy</a:t>
+            </a:r>
+          </a:p>
+          <a:p>
+            <a:pPr lvl="1"/>
+            <a:r>
+              <a:rPr lang="en-US" dirty="0"/>
+              <a:t>Use of a grid of “reservation” tiles</a:t>
+            </a:r>
+          </a:p>
+          <a:p>
+            <a:pPr lvl="1"/>
+            <a:r>
+              <a:rPr lang="en-US" dirty="0"/>
+              <a:t>Dealing with acceleration in the intersection. Consider trajectories where the vehicle accelerates to max velocity, and maintains current velocity</a:t>
+            </a:r>
+          </a:p>
+          <a:p>
+            <a:pPr lvl="1"/>
+            <a:r>
+              <a:rPr lang="en-US" dirty="0"/>
+              <a:t>Force a minimum velocity</a:t>
+            </a:r>
+          </a:p>
+          <a:p>
+            <a:pPr lvl="1"/>
+            <a:r>
+              <a:rPr lang="en-US" dirty="0"/>
+              <a:t>Ability to change the policy</a:t>
+            </a:r>
+          </a:p>
+        </p:txBody>
+      </p:sp>
+    </p:spTree>
+    <p:extLst>
+      <p:ext uri="{BB962C8B-B14F-4D97-AF65-F5344CB8AC3E}">
+        <p14:creationId xmlns:p14="http://schemas.microsoft.com/office/powerpoint/2010/main" val="1790021222"/>
+      </p:ext>
+    </p:extLst>
+  </p:cSld>
+  <p:clrMapOvr>
+    <a:masterClrMapping/>
+  </p:clrMapOvr>
+</p:sld>
+</file>
+
+<file path=ppt/slides/slide4.xml><?xml version="1.0" encoding="utf-8"?>
+<p:sld xmlns:a="http://schemas.openxmlformats.org/drawingml/2006/main" xmlns:r="http://schemas.openxmlformats.org/officeDocument/2006/relationships" xmlns:p="http://schemas.openxmlformats.org/presentationml/2006/main">
+  <p:cSld>
+    <p:spTree>
+      <p:nvGrpSpPr>
+        <p:cNvPr id="1" name=""/>
+        <p:cNvGrpSpPr/>
+        <p:nvPr/>
+      </p:nvGrpSpPr>
+      <p:grpSpPr>
+        <a:xfrm>
+          <a:off x="0" y="0"/>
+          <a:ext cx="0" cy="0"/>
+          <a:chOff x="0" y="0"/>
+          <a:chExt cx="0" cy="0"/>
+        </a:xfrm>
+      </p:grpSpPr>
+      <p:sp>
+        <p:nvSpPr>
+          <p:cNvPr id="2" name="Title 1">
+            <a:extLst>
+              <a:ext uri="{FF2B5EF4-FFF2-40B4-BE49-F238E27FC236}">
+                <a16:creationId xmlns:a16="http://schemas.microsoft.com/office/drawing/2014/main" id="{25D85BD1-3E04-4D69-B046-1B2AE3247419}"/>
+              </a:ext>
+            </a:extLst>
+          </p:cNvPr>
+          <p:cNvSpPr>
+            <a:spLocks noGrp="1"/>
+          </p:cNvSpPr>
+          <p:nvPr>
+            <p:ph type="title"/>
+          </p:nvPr>
+        </p:nvSpPr>
+        <p:spPr/>
+        <p:txBody>
+          <a:bodyPr/>
+          <a:lstStyle/>
+          <a:p>
+            <a:r>
+              <a:rPr lang="en-US" dirty="0">
+                <a:latin typeface="Andalus" panose="02020603050405020304" pitchFamily="18" charset="-78"/>
+                <a:cs typeface="Andalus" panose="02020603050405020304" pitchFamily="18" charset="-78"/>
+              </a:rPr>
+              <a:t>Project Scope &amp; Implementation</a:t>
+            </a:r>
+          </a:p>
+        </p:txBody>
+      </p:sp>
+      <p:sp>
+        <p:nvSpPr>
+          <p:cNvPr id="3" name="Content Placeholder 2">
+            <a:extLst>
+              <a:ext uri="{FF2B5EF4-FFF2-40B4-BE49-F238E27FC236}">
+                <a16:creationId xmlns:a16="http://schemas.microsoft.com/office/drawing/2014/main" id="{0F0079DE-59E5-4E96-BCE2-FF51FC105CAF}"/>
+              </a:ext>
+            </a:extLst>
+          </p:cNvPr>
+          <p:cNvSpPr>
+            <a:spLocks noGrp="1"/>
+          </p:cNvSpPr>
+          <p:nvPr>
+            <p:ph idx="1"/>
+          </p:nvPr>
+        </p:nvSpPr>
+        <p:spPr/>
+        <p:txBody>
+          <a:bodyPr>
+            <a:normAutofit lnSpcReduction="10000"/>
+          </a:bodyPr>
+          <a:lstStyle/>
+          <a:p>
+            <a:r>
+              <a:rPr lang="en-US" dirty="0"/>
+              <a:t>4-way 3-dedicated-lane intersection with a centralized architecture </a:t>
+            </a:r>
+          </a:p>
+          <a:p>
+            <a:r>
+              <a:rPr lang="en-US" dirty="0"/>
+              <a:t>Keep the number of messages/communication V2V to a minimum, for scalability purposes and respecting each vehicle’s privacy </a:t>
+            </a:r>
+          </a:p>
+          <a:p>
+            <a:r>
+              <a:rPr lang="en-US" dirty="0"/>
+              <a:t>Assumptions: </a:t>
+            </a:r>
+          </a:p>
+          <a:p>
+            <a:pPr lvl="1"/>
+            <a:r>
+              <a:rPr lang="en-US" dirty="0"/>
+              <a:t>Fully autonomous vehicles (Tesla Model S), focusing less on Driver Agents and mostly on the arbiter/Intersection Manager</a:t>
+            </a:r>
+          </a:p>
+          <a:p>
+            <a:pPr lvl="1"/>
+            <a:r>
+              <a:rPr lang="en-US" dirty="0"/>
+              <a:t>No communication failure or delay</a:t>
+            </a:r>
+          </a:p>
+          <a:p>
+            <a:pPr lvl="1"/>
+            <a:r>
+              <a:rPr lang="en-US" dirty="0"/>
+              <a:t>No execution error</a:t>
+            </a:r>
+          </a:p>
+          <a:p>
+            <a:pPr lvl="1"/>
+            <a:r>
+              <a:rPr lang="en-US" dirty="0"/>
+              <a:t>A high resource powerful computer system placed at the intersection powering the Intersection Manager (IM)</a:t>
+            </a:r>
+          </a:p>
+          <a:p>
+            <a:r>
+              <a:rPr lang="en-US" dirty="0">
+                <a:cs typeface="Traditional Arabic" panose="02020603050405020304" pitchFamily="18" charset="-78"/>
+              </a:rPr>
+              <a:t>To accomplish this we will use ROS, and a visualization software.</a:t>
+            </a:r>
+          </a:p>
+          <a:p>
+            <a:endParaRPr lang="en-US" dirty="0"/>
+          </a:p>
+          <a:p>
+            <a:endParaRPr lang="en-US" dirty="0"/>
+          </a:p>
+        </p:txBody>
+      </p:sp>
+    </p:spTree>
+    <p:extLst>
+      <p:ext uri="{BB962C8B-B14F-4D97-AF65-F5344CB8AC3E}">
+        <p14:creationId xmlns:p14="http://schemas.microsoft.com/office/powerpoint/2010/main" val="2894363390"/>
+      </p:ext>
+    </p:extLst>
+  </p:cSld>
+  <p:clrMapOvr>
+    <a:masterClrMapping/>
+  </p:clrMapOvr>
+</p:sld>
+</file>
+
+<file path=ppt/slides/slide5.xml><?xml version="1.0" encoding="utf-8"?>
 <p:sld xmlns:a="http://schemas.openxmlformats.org/drawingml/2006/main" xmlns:r="http://schemas.openxmlformats.org/officeDocument/2006/relationships" xmlns:p="http://schemas.openxmlformats.org/presentationml/2006/main">
   <p:cSld>
     <p:bg>
@@ -4151,233 +4354,50 @@
           </a:prstGeom>
         </p:spPr>
       </p:pic>
+      <p:sp>
+        <p:nvSpPr>
+          <p:cNvPr id="3" name="Rectangle 2">
+            <a:extLst>
+              <a:ext uri="{FF2B5EF4-FFF2-40B4-BE49-F238E27FC236}">
+                <a16:creationId xmlns:a16="http://schemas.microsoft.com/office/drawing/2014/main" id="{C16719D0-2CBA-4B37-9063-BD4A7611E58A}"/>
+              </a:ext>
+            </a:extLst>
+          </p:cNvPr>
+          <p:cNvSpPr/>
+          <p:nvPr/>
+        </p:nvSpPr>
+        <p:spPr>
+          <a:xfrm>
+            <a:off x="9713804" y="5568202"/>
+            <a:ext cx="2186817" cy="400110"/>
+          </a:xfrm>
+          <a:prstGeom prst="rect">
+            <a:avLst/>
+          </a:prstGeom>
+        </p:spPr>
+        <p:txBody>
+          <a:bodyPr wrap="none">
+            <a:spAutoFit/>
+          </a:bodyPr>
+          <a:lstStyle/>
+          <a:p>
+            <a:r>
+              <a:rPr lang="en-US" sz="2000" dirty="0">
+                <a:latin typeface="Andalus" panose="02020603050405020304" pitchFamily="18" charset="-78"/>
+                <a:cs typeface="Andalus" panose="02020603050405020304" pitchFamily="18" charset="-78"/>
+              </a:rPr>
+              <a:t>Intersection Layout</a:t>
+            </a:r>
+            <a:endParaRPr lang="en-US" sz="2000" dirty="0">
+              <a:latin typeface="+mj-lt"/>
+            </a:endParaRPr>
+          </a:p>
+        </p:txBody>
+      </p:sp>
     </p:spTree>
     <p:extLst>
       <p:ext uri="{BB962C8B-B14F-4D97-AF65-F5344CB8AC3E}">
         <p14:creationId xmlns:p14="http://schemas.microsoft.com/office/powerpoint/2010/main" val="1279582230"/>
-      </p:ext>
-    </p:extLst>
-  </p:cSld>
-  <p:clrMapOvr>
-    <a:masterClrMapping/>
-  </p:clrMapOvr>
-</p:sld>
-</file>
-
-<file path=ppt/slides/slide4.xml><?xml version="1.0" encoding="utf-8"?>
-<p:sld xmlns:a="http://schemas.openxmlformats.org/drawingml/2006/main" xmlns:r="http://schemas.openxmlformats.org/officeDocument/2006/relationships" xmlns:p="http://schemas.openxmlformats.org/presentationml/2006/main">
-  <p:cSld>
-    <p:spTree>
-      <p:nvGrpSpPr>
-        <p:cNvPr id="1" name=""/>
-        <p:cNvGrpSpPr/>
-        <p:nvPr/>
-      </p:nvGrpSpPr>
-      <p:grpSpPr>
-        <a:xfrm>
-          <a:off x="0" y="0"/>
-          <a:ext cx="0" cy="0"/>
-          <a:chOff x="0" y="0"/>
-          <a:chExt cx="0" cy="0"/>
-        </a:xfrm>
-      </p:grpSpPr>
-      <p:sp>
-        <p:nvSpPr>
-          <p:cNvPr id="2" name="Title 1">
-            <a:extLst>
-              <a:ext uri="{FF2B5EF4-FFF2-40B4-BE49-F238E27FC236}">
-                <a16:creationId xmlns:a16="http://schemas.microsoft.com/office/drawing/2014/main" id="{DF2DACD5-3964-49E8-9CE0-0B08B7E5CADE}"/>
-              </a:ext>
-            </a:extLst>
-          </p:cNvPr>
-          <p:cNvSpPr>
-            <a:spLocks noGrp="1"/>
-          </p:cNvSpPr>
-          <p:nvPr>
-            <p:ph type="title"/>
-          </p:nvPr>
-        </p:nvSpPr>
-        <p:spPr/>
-        <p:txBody>
-          <a:bodyPr/>
-          <a:lstStyle/>
-          <a:p>
-            <a:r>
-              <a:rPr lang="en-US" dirty="0"/>
-              <a:t>Previous Work</a:t>
-            </a:r>
-          </a:p>
-        </p:txBody>
-      </p:sp>
-      <p:sp>
-        <p:nvSpPr>
-          <p:cNvPr id="3" name="Content Placeholder 2">
-            <a:extLst>
-              <a:ext uri="{FF2B5EF4-FFF2-40B4-BE49-F238E27FC236}">
-                <a16:creationId xmlns:a16="http://schemas.microsoft.com/office/drawing/2014/main" id="{3872D00B-8186-4575-85F6-68F3C00DF72C}"/>
-              </a:ext>
-            </a:extLst>
-          </p:cNvPr>
-          <p:cNvSpPr>
-            <a:spLocks noGrp="1"/>
-          </p:cNvSpPr>
-          <p:nvPr>
-            <p:ph idx="1"/>
-          </p:nvPr>
-        </p:nvSpPr>
-        <p:spPr>
-          <a:xfrm>
-            <a:off x="838200" y="1825625"/>
-            <a:ext cx="10515600" cy="4351338"/>
-          </a:xfrm>
-        </p:spPr>
-        <p:txBody>
-          <a:bodyPr/>
-          <a:lstStyle/>
-          <a:p>
-            <a:r>
-              <a:rPr lang="en-US" dirty="0"/>
-              <a:t>Worked on implementing an AIM System for a previous class</a:t>
-            </a:r>
-          </a:p>
-          <a:p>
-            <a:r>
-              <a:rPr lang="en-US" dirty="0"/>
-              <a:t>“A Multiagent Approach to Autonomous Intersection Management” by Kurt </a:t>
-            </a:r>
-            <a:r>
-              <a:rPr lang="en-US" dirty="0" err="1"/>
-              <a:t>Dresner</a:t>
-            </a:r>
-            <a:r>
-              <a:rPr lang="en-US" dirty="0"/>
-              <a:t> and Peter Stone</a:t>
-            </a:r>
-          </a:p>
-          <a:p>
-            <a:pPr lvl="1"/>
-            <a:r>
-              <a:rPr lang="en-US" dirty="0"/>
-              <a:t>Reservation system using “First Come, First Served” policy</a:t>
-            </a:r>
-          </a:p>
-          <a:p>
-            <a:pPr lvl="1"/>
-            <a:r>
-              <a:rPr lang="en-US" dirty="0"/>
-              <a:t>Use of a grid of “reservation” tiles</a:t>
-            </a:r>
-          </a:p>
-          <a:p>
-            <a:pPr lvl="1"/>
-            <a:r>
-              <a:rPr lang="en-US" dirty="0"/>
-              <a:t>Dealing with acceleration in the intersection. Consider trajectories where the vehicle accelerates to max velocity, and maintains current velocity</a:t>
-            </a:r>
-          </a:p>
-          <a:p>
-            <a:pPr lvl="1"/>
-            <a:r>
-              <a:rPr lang="en-US" dirty="0"/>
-              <a:t>Force a minimum velocity</a:t>
-            </a:r>
-          </a:p>
-          <a:p>
-            <a:pPr lvl="1"/>
-            <a:r>
-              <a:rPr lang="en-US" dirty="0"/>
-              <a:t>Ability to change the policy</a:t>
-            </a:r>
-          </a:p>
-        </p:txBody>
-      </p:sp>
-    </p:spTree>
-    <p:extLst>
-      <p:ext uri="{BB962C8B-B14F-4D97-AF65-F5344CB8AC3E}">
-        <p14:creationId xmlns:p14="http://schemas.microsoft.com/office/powerpoint/2010/main" val="1790021222"/>
-      </p:ext>
-    </p:extLst>
-  </p:cSld>
-  <p:clrMapOvr>
-    <a:masterClrMapping/>
-  </p:clrMapOvr>
-</p:sld>
-</file>
-
-<file path=ppt/slides/slide5.xml><?xml version="1.0" encoding="utf-8"?>
-<p:sld xmlns:a="http://schemas.openxmlformats.org/drawingml/2006/main" xmlns:r="http://schemas.openxmlformats.org/officeDocument/2006/relationships" xmlns:p="http://schemas.openxmlformats.org/presentationml/2006/main">
-  <p:cSld>
-    <p:spTree>
-      <p:nvGrpSpPr>
-        <p:cNvPr id="1" name=""/>
-        <p:cNvGrpSpPr/>
-        <p:nvPr/>
-      </p:nvGrpSpPr>
-      <p:grpSpPr>
-        <a:xfrm>
-          <a:off x="0" y="0"/>
-          <a:ext cx="0" cy="0"/>
-          <a:chOff x="0" y="0"/>
-          <a:chExt cx="0" cy="0"/>
-        </a:xfrm>
-      </p:grpSpPr>
-      <p:sp>
-        <p:nvSpPr>
-          <p:cNvPr id="2" name="Title 1">
-            <a:extLst>
-              <a:ext uri="{FF2B5EF4-FFF2-40B4-BE49-F238E27FC236}">
-                <a16:creationId xmlns:a16="http://schemas.microsoft.com/office/drawing/2014/main" id="{25D85BD1-3E04-4D69-B046-1B2AE3247419}"/>
-              </a:ext>
-            </a:extLst>
-          </p:cNvPr>
-          <p:cNvSpPr>
-            <a:spLocks noGrp="1"/>
-          </p:cNvSpPr>
-          <p:nvPr>
-            <p:ph type="title"/>
-          </p:nvPr>
-        </p:nvSpPr>
-        <p:spPr/>
-        <p:txBody>
-          <a:bodyPr/>
-          <a:lstStyle/>
-          <a:p>
-            <a:r>
-              <a:rPr lang="en-US" dirty="0"/>
-              <a:t>Project Scope &amp; Implementation</a:t>
-            </a:r>
-          </a:p>
-        </p:txBody>
-      </p:sp>
-      <p:sp>
-        <p:nvSpPr>
-          <p:cNvPr id="3" name="Content Placeholder 2">
-            <a:extLst>
-              <a:ext uri="{FF2B5EF4-FFF2-40B4-BE49-F238E27FC236}">
-                <a16:creationId xmlns:a16="http://schemas.microsoft.com/office/drawing/2014/main" id="{0F0079DE-59E5-4E96-BCE2-FF51FC105CAF}"/>
-              </a:ext>
-            </a:extLst>
-          </p:cNvPr>
-          <p:cNvSpPr>
-            <a:spLocks noGrp="1"/>
-          </p:cNvSpPr>
-          <p:nvPr>
-            <p:ph idx="1"/>
-          </p:nvPr>
-        </p:nvSpPr>
-        <p:spPr/>
-        <p:txBody>
-          <a:bodyPr/>
-          <a:lstStyle/>
-          <a:p>
-            <a:endParaRPr lang="en-US" dirty="0"/>
-          </a:p>
-        </p:txBody>
-      </p:sp>
-    </p:spTree>
-    <p:extLst>
-      <p:ext uri="{BB962C8B-B14F-4D97-AF65-F5344CB8AC3E}">
-        <p14:creationId xmlns:p14="http://schemas.microsoft.com/office/powerpoint/2010/main" val="2894363390"/>
       </p:ext>
     </p:extLst>
   </p:cSld>
@@ -4426,8 +4446,11 @@
           <a:lstStyle/>
           <a:p>
             <a:r>
-              <a:rPr lang="en-US" dirty="0"/>
-              <a:t>Goals</a:t>
+              <a:rPr lang="en-US" dirty="0">
+                <a:latin typeface="Andalus" panose="02020603050405020304" pitchFamily="18" charset="-78"/>
+                <a:cs typeface="Andalus" panose="02020603050405020304" pitchFamily="18" charset="-78"/>
+              </a:rPr>
+              <a:t>Goals &amp; Measures of Success</a:t>
             </a:r>
           </a:p>
         </p:txBody>
@@ -4488,14 +4511,14 @@
             <a:pPr lvl="1"/>
             <a:r>
               <a:rPr lang="en-US" dirty="0"/>
-              <a:t>Traffic lights</a:t>
+              <a:t>Traditional traffic lights</a:t>
             </a:r>
           </a:p>
           <a:p>
             <a:pPr lvl="1"/>
             <a:r>
               <a:rPr lang="en-US" dirty="0"/>
-              <a:t>Stop Signs</a:t>
+              <a:t>Stop signs</a:t>
             </a:r>
           </a:p>
           <a:p>

</xml_diff>